<commit_message>
Week 13! Holy cow.
</commit_message>
<xml_diff>
--- a/Week 10 (Nov. 17th, STL - Michael sick)/Standard Template Librabry.pptx
+++ b/Week 10 (Nov. 17th, STL - Michael sick)/Standard Template Librabry.pptx
@@ -5,7 +5,7 @@
     <p:sldMasterId id="2147483672" r:id="rId1"/>
   </p:sldMasterIdLst>
   <p:notesMasterIdLst>
-    <p:notesMasterId r:id="rId16"/>
+    <p:notesMasterId r:id="rId15"/>
   </p:notesMasterIdLst>
   <p:sldIdLst>
     <p:sldId id="256" r:id="rId2"/>
@@ -21,7 +21,6 @@
     <p:sldId id="266" r:id="rId12"/>
     <p:sldId id="267" r:id="rId13"/>
     <p:sldId id="269" r:id="rId14"/>
-    <p:sldId id="270" r:id="rId15"/>
   </p:sldIdLst>
   <p:sldSz cx="12192000" cy="6858000"/>
   <p:notesSz cx="6858000" cy="9144000"/>
@@ -120,6 +119,11 @@
       </a:defRPr>
     </a:lvl9pPr>
   </p:defaultTextStyle>
+  <p:extLst>
+    <p:ext uri="{EFAFB233-063F-42B5-8137-9DF3F51BA10A}">
+      <p15:sldGuideLst xmlns:p15="http://schemas.microsoft.com/office/powerpoint/2012/main"/>
+    </p:ext>
+  </p:extLst>
 </p:presentation>
 </file>
 
@@ -205,7 +209,7 @@
           <a:p>
             <a:fld id="{451EEE9D-EA0D-4B8A-8D5B-F166ED190AD3}" type="datetimeFigureOut">
               <a:rPr lang="en-CA" smtClean="0"/>
-              <a:t>2020-12-03</a:t>
+              <a:t>2025-11-27</a:t>
             </a:fld>
             <a:endParaRPr lang="en-CA"/>
           </a:p>
@@ -812,90 +816,6 @@
 </p:notes>
 </file>
 
-<file path=ppt/notesSlides/notesSlide13.xml><?xml version="1.0" encoding="utf-8"?>
-<p:notes xmlns:a="http://schemas.openxmlformats.org/drawingml/2006/main" xmlns:r="http://schemas.openxmlformats.org/officeDocument/2006/relationships" xmlns:p="http://schemas.openxmlformats.org/presentationml/2006/main">
-  <p:cSld>
-    <p:spTree>
-      <p:nvGrpSpPr>
-        <p:cNvPr id="1" name=""/>
-        <p:cNvGrpSpPr/>
-        <p:nvPr/>
-      </p:nvGrpSpPr>
-      <p:grpSpPr>
-        <a:xfrm>
-          <a:off x="0" y="0"/>
-          <a:ext cx="0" cy="0"/>
-          <a:chOff x="0" y="0"/>
-          <a:chExt cx="0" cy="0"/>
-        </a:xfrm>
-      </p:grpSpPr>
-      <p:sp>
-        <p:nvSpPr>
-          <p:cNvPr id="2" name="Slide Image Placeholder 1"/>
-          <p:cNvSpPr>
-            <a:spLocks noGrp="1" noRot="1" noChangeAspect="1"/>
-          </p:cNvSpPr>
-          <p:nvPr>
-            <p:ph type="sldImg"/>
-          </p:nvPr>
-        </p:nvSpPr>
-        <p:spPr/>
-      </p:sp>
-      <p:sp>
-        <p:nvSpPr>
-          <p:cNvPr id="3" name="Notes Placeholder 2"/>
-          <p:cNvSpPr>
-            <a:spLocks noGrp="1"/>
-          </p:cNvSpPr>
-          <p:nvPr>
-            <p:ph type="body" idx="1"/>
-          </p:nvPr>
-        </p:nvSpPr>
-        <p:spPr/>
-        <p:txBody>
-          <a:bodyPr/>
-          <a:lstStyle/>
-          <a:p>
-            <a:endParaRPr lang="en-CA" dirty="0"/>
-          </a:p>
-        </p:txBody>
-      </p:sp>
-      <p:sp>
-        <p:nvSpPr>
-          <p:cNvPr id="4" name="Slide Number Placeholder 3"/>
-          <p:cNvSpPr>
-            <a:spLocks noGrp="1"/>
-          </p:cNvSpPr>
-          <p:nvPr>
-            <p:ph type="sldNum" sz="quarter" idx="5"/>
-          </p:nvPr>
-        </p:nvSpPr>
-        <p:spPr/>
-        <p:txBody>
-          <a:bodyPr/>
-          <a:lstStyle/>
-          <a:p>
-            <a:fld id="{2900E13E-EEFC-4DCB-A80D-CAE9B6D46C01}" type="slidenum">
-              <a:rPr lang="en-CA" smtClean="0"/>
-              <a:t>14</a:t>
-            </a:fld>
-            <a:endParaRPr lang="en-CA"/>
-          </a:p>
-        </p:txBody>
-      </p:sp>
-    </p:spTree>
-    <p:extLst>
-      <p:ext uri="{BB962C8B-B14F-4D97-AF65-F5344CB8AC3E}">
-        <p14:creationId xmlns:p14="http://schemas.microsoft.com/office/powerpoint/2010/main" val="2271473196"/>
-      </p:ext>
-    </p:extLst>
-  </p:cSld>
-  <p:clrMapOvr>
-    <a:masterClrMapping/>
-  </p:clrMapOvr>
-</p:notes>
-</file>
-
 <file path=ppt/notesSlides/notesSlide2.xml><?xml version="1.0" encoding="utf-8"?>
 <p:notes xmlns:a="http://schemas.openxmlformats.org/drawingml/2006/main" xmlns:r="http://schemas.openxmlformats.org/officeDocument/2006/relationships" xmlns:p="http://schemas.openxmlformats.org/presentationml/2006/main">
   <p:cSld>
@@ -1699,7 +1619,7 @@
           <a:p>
             <a:fld id="{8B9BCBC4-B18E-4CE9-AE45-0D26726D84DA}" type="datetimeFigureOut">
               <a:rPr lang="en-CA" smtClean="0"/>
-              <a:t>2020-12-03</a:t>
+              <a:t>2025-11-27</a:t>
             </a:fld>
             <a:endParaRPr lang="en-CA"/>
           </a:p>
@@ -1869,7 +1789,7 @@
           <a:p>
             <a:fld id="{8B9BCBC4-B18E-4CE9-AE45-0D26726D84DA}" type="datetimeFigureOut">
               <a:rPr lang="en-CA" smtClean="0"/>
-              <a:t>2020-12-03</a:t>
+              <a:t>2025-11-27</a:t>
             </a:fld>
             <a:endParaRPr lang="en-CA"/>
           </a:p>
@@ -2049,7 +1969,7 @@
           <a:p>
             <a:fld id="{8B9BCBC4-B18E-4CE9-AE45-0D26726D84DA}" type="datetimeFigureOut">
               <a:rPr lang="en-CA" smtClean="0"/>
-              <a:t>2020-12-03</a:t>
+              <a:t>2025-11-27</a:t>
             </a:fld>
             <a:endParaRPr lang="en-CA"/>
           </a:p>
@@ -2219,7 +2139,7 @@
           <a:p>
             <a:fld id="{8B9BCBC4-B18E-4CE9-AE45-0D26726D84DA}" type="datetimeFigureOut">
               <a:rPr lang="en-CA" smtClean="0"/>
-              <a:t>2020-12-03</a:t>
+              <a:t>2025-11-27</a:t>
             </a:fld>
             <a:endParaRPr lang="en-CA"/>
           </a:p>
@@ -2465,7 +2385,7 @@
           <a:p>
             <a:fld id="{8B9BCBC4-B18E-4CE9-AE45-0D26726D84DA}" type="datetimeFigureOut">
               <a:rPr lang="en-CA" smtClean="0"/>
-              <a:t>2020-12-03</a:t>
+              <a:t>2025-11-27</a:t>
             </a:fld>
             <a:endParaRPr lang="en-CA"/>
           </a:p>
@@ -2697,7 +2617,7 @@
           <a:p>
             <a:fld id="{8B9BCBC4-B18E-4CE9-AE45-0D26726D84DA}" type="datetimeFigureOut">
               <a:rPr lang="en-CA" smtClean="0"/>
-              <a:t>2020-12-03</a:t>
+              <a:t>2025-11-27</a:t>
             </a:fld>
             <a:endParaRPr lang="en-CA"/>
           </a:p>
@@ -3064,7 +2984,7 @@
           <a:p>
             <a:fld id="{8B9BCBC4-B18E-4CE9-AE45-0D26726D84DA}" type="datetimeFigureOut">
               <a:rPr lang="en-CA" smtClean="0"/>
-              <a:t>2020-12-03</a:t>
+              <a:t>2025-11-27</a:t>
             </a:fld>
             <a:endParaRPr lang="en-CA"/>
           </a:p>
@@ -3182,7 +3102,7 @@
           <a:p>
             <a:fld id="{8B9BCBC4-B18E-4CE9-AE45-0D26726D84DA}" type="datetimeFigureOut">
               <a:rPr lang="en-CA" smtClean="0"/>
-              <a:t>2020-12-03</a:t>
+              <a:t>2025-11-27</a:t>
             </a:fld>
             <a:endParaRPr lang="en-CA"/>
           </a:p>
@@ -3277,7 +3197,7 @@
           <a:p>
             <a:fld id="{8B9BCBC4-B18E-4CE9-AE45-0D26726D84DA}" type="datetimeFigureOut">
               <a:rPr lang="en-CA" smtClean="0"/>
-              <a:t>2020-12-03</a:t>
+              <a:t>2025-11-27</a:t>
             </a:fld>
             <a:endParaRPr lang="en-CA"/>
           </a:p>
@@ -3554,7 +3474,7 @@
           <a:p>
             <a:fld id="{8B9BCBC4-B18E-4CE9-AE45-0D26726D84DA}" type="datetimeFigureOut">
               <a:rPr lang="en-CA" smtClean="0"/>
-              <a:t>2020-12-03</a:t>
+              <a:t>2025-11-27</a:t>
             </a:fld>
             <a:endParaRPr lang="en-CA"/>
           </a:p>
@@ -3811,7 +3731,7 @@
           <a:p>
             <a:fld id="{8B9BCBC4-B18E-4CE9-AE45-0D26726D84DA}" type="datetimeFigureOut">
               <a:rPr lang="en-CA" smtClean="0"/>
-              <a:t>2020-12-03</a:t>
+              <a:t>2025-11-27</a:t>
             </a:fld>
             <a:endParaRPr lang="en-CA"/>
           </a:p>
@@ -4033,7 +3953,7 @@
           <a:p>
             <a:fld id="{8B9BCBC4-B18E-4CE9-AE45-0D26726D84DA}" type="datetimeFigureOut">
               <a:rPr lang="en-CA" smtClean="0"/>
-              <a:t>2020-12-03</a:t>
+              <a:t>2025-11-27</a:t>
             </a:fld>
             <a:endParaRPr lang="en-CA"/>
           </a:p>
@@ -6020,267 +5940,6 @@
 </p:sld>
 </file>
 
-<file path=ppt/slides/slide14.xml><?xml version="1.0" encoding="utf-8"?>
-<p:sld xmlns:a="http://schemas.openxmlformats.org/drawingml/2006/main" xmlns:r="http://schemas.openxmlformats.org/officeDocument/2006/relationships" xmlns:p="http://schemas.openxmlformats.org/presentationml/2006/main">
-  <p:cSld>
-    <p:spTree>
-      <p:nvGrpSpPr>
-        <p:cNvPr id="1" name=""/>
-        <p:cNvGrpSpPr/>
-        <p:nvPr/>
-      </p:nvGrpSpPr>
-      <p:grpSpPr>
-        <a:xfrm>
-          <a:off x="0" y="0"/>
-          <a:ext cx="0" cy="0"/>
-          <a:chOff x="0" y="0"/>
-          <a:chExt cx="0" cy="0"/>
-        </a:xfrm>
-      </p:grpSpPr>
-      <p:sp>
-        <p:nvSpPr>
-          <p:cNvPr id="2" name="Title 1">
-            <a:extLst>
-              <a:ext uri="{FF2B5EF4-FFF2-40B4-BE49-F238E27FC236}">
-                <a16:creationId xmlns:a16="http://schemas.microsoft.com/office/drawing/2014/main" id="{FF6EFF1B-69B9-4308-A381-EBA830737CF2}"/>
-              </a:ext>
-            </a:extLst>
-          </p:cNvPr>
-          <p:cNvSpPr>
-            <a:spLocks noGrp="1"/>
-          </p:cNvSpPr>
-          <p:nvPr>
-            <p:ph type="title"/>
-          </p:nvPr>
-        </p:nvSpPr>
-        <p:spPr>
-          <a:xfrm>
-            <a:off x="1873560" y="237663"/>
-            <a:ext cx="10318440" cy="830629"/>
-          </a:xfrm>
-        </p:spPr>
-        <p:txBody>
-          <a:bodyPr>
-            <a:normAutofit/>
-          </a:bodyPr>
-          <a:lstStyle/>
-          <a:p>
-            <a:r>
-              <a:rPr lang="en-US" dirty="0">
-                <a:solidFill>
-                  <a:schemeClr val="bg1"/>
-                </a:solidFill>
-              </a:rPr>
-              <a:t>Before We Code…</a:t>
-            </a:r>
-            <a:endParaRPr lang="en-CA" dirty="0">
-              <a:solidFill>
-                <a:schemeClr val="bg1"/>
-              </a:solidFill>
-            </a:endParaRPr>
-          </a:p>
-        </p:txBody>
-      </p:sp>
-      <p:sp>
-        <p:nvSpPr>
-          <p:cNvPr id="3" name="Content Placeholder 2">
-            <a:extLst>
-              <a:ext uri="{FF2B5EF4-FFF2-40B4-BE49-F238E27FC236}">
-                <a16:creationId xmlns:a16="http://schemas.microsoft.com/office/drawing/2014/main" id="{27CFDD9A-59BA-4961-B6AA-310DCBE54C23}"/>
-              </a:ext>
-            </a:extLst>
-          </p:cNvPr>
-          <p:cNvSpPr>
-            <a:spLocks noGrp="1"/>
-          </p:cNvSpPr>
-          <p:nvPr>
-            <p:ph idx="1"/>
-          </p:nvPr>
-        </p:nvSpPr>
-        <p:spPr/>
-        <p:txBody>
-          <a:bodyPr/>
-          <a:lstStyle/>
-          <a:p>
-            <a:pPr lvl="1"/>
-            <a:endParaRPr lang="en-US" dirty="0">
-              <a:latin typeface="urw-din"/>
-            </a:endParaRPr>
-          </a:p>
-          <a:p>
-            <a:pPr lvl="1"/>
-            <a:r>
-              <a:rPr lang="en-CA" b="1" dirty="0">
-                <a:latin typeface="urw-din"/>
-              </a:rPr>
-              <a:t>What’s Left?</a:t>
-            </a:r>
-          </a:p>
-          <a:p>
-            <a:pPr lvl="2"/>
-            <a:r>
-              <a:rPr lang="en-CA" dirty="0">
-                <a:latin typeface="urw-din"/>
-              </a:rPr>
-              <a:t>Project #2 – Due Dec 10</a:t>
-            </a:r>
-            <a:r>
-              <a:rPr lang="en-CA" baseline="30000" dirty="0">
-                <a:latin typeface="urw-din"/>
-              </a:rPr>
-              <a:t>th</a:t>
-            </a:r>
-            <a:r>
-              <a:rPr lang="en-CA" dirty="0">
-                <a:latin typeface="urw-din"/>
-              </a:rPr>
-              <a:t> @ 11:59PM</a:t>
-            </a:r>
-          </a:p>
-          <a:p>
-            <a:pPr lvl="2"/>
-            <a:r>
-              <a:rPr lang="en-CA" dirty="0">
-                <a:latin typeface="urw-din"/>
-              </a:rPr>
-              <a:t>2 Quizzes (2%/each)</a:t>
-            </a:r>
-          </a:p>
-          <a:p>
-            <a:pPr lvl="3"/>
-            <a:r>
-              <a:rPr lang="en-CA" dirty="0">
-                <a:latin typeface="urw-din"/>
-              </a:rPr>
-              <a:t>Quiz #7 – Due Dec 10</a:t>
-            </a:r>
-            <a:r>
-              <a:rPr lang="en-CA" baseline="30000" dirty="0">
-                <a:latin typeface="urw-din"/>
-              </a:rPr>
-              <a:t>th</a:t>
-            </a:r>
-            <a:r>
-              <a:rPr lang="en-CA" dirty="0">
-                <a:latin typeface="urw-din"/>
-              </a:rPr>
-              <a:t> @ 3:59PM</a:t>
-            </a:r>
-          </a:p>
-          <a:p>
-            <a:pPr lvl="4"/>
-            <a:r>
-              <a:rPr lang="en-CA" dirty="0">
-                <a:latin typeface="urw-din"/>
-              </a:rPr>
-              <a:t>Covers This Lectures Content</a:t>
-            </a:r>
-          </a:p>
-          <a:p>
-            <a:pPr lvl="3"/>
-            <a:r>
-              <a:rPr lang="en-CA" dirty="0">
-                <a:latin typeface="urw-din"/>
-              </a:rPr>
-              <a:t>Quiz #8 – Due Dec 17</a:t>
-            </a:r>
-            <a:r>
-              <a:rPr lang="en-CA" baseline="30000" dirty="0">
-                <a:latin typeface="urw-din"/>
-              </a:rPr>
-              <a:t>th</a:t>
-            </a:r>
-            <a:r>
-              <a:rPr lang="en-CA" dirty="0">
-                <a:latin typeface="urw-din"/>
-              </a:rPr>
-              <a:t> @ 3:59PM</a:t>
-            </a:r>
-          </a:p>
-          <a:p>
-            <a:pPr lvl="4"/>
-            <a:r>
-              <a:rPr lang="en-CA" dirty="0">
-                <a:latin typeface="urw-din"/>
-              </a:rPr>
-              <a:t>Covers All Content For The Course</a:t>
-            </a:r>
-          </a:p>
-          <a:p>
-            <a:pPr lvl="4"/>
-            <a:r>
-              <a:rPr lang="en-CA" dirty="0">
-                <a:latin typeface="urw-din"/>
-              </a:rPr>
-              <a:t>This serves as a low risk assessment to see how you should fair on the final exam’s theory portion.</a:t>
-            </a:r>
-          </a:p>
-          <a:p>
-            <a:pPr lvl="2"/>
-            <a:r>
-              <a:rPr lang="en-CA" dirty="0">
-                <a:latin typeface="urw-din"/>
-              </a:rPr>
-              <a:t>Final Exam Review – Dec 10</a:t>
-            </a:r>
-            <a:r>
-              <a:rPr lang="en-CA" baseline="30000" dirty="0">
-                <a:latin typeface="urw-din"/>
-              </a:rPr>
-              <a:t>th</a:t>
-            </a:r>
-            <a:r>
-              <a:rPr lang="en-CA" dirty="0">
-                <a:latin typeface="urw-din"/>
-              </a:rPr>
-              <a:t> @ 4:00PM</a:t>
-            </a:r>
-          </a:p>
-          <a:p>
-            <a:pPr lvl="3"/>
-            <a:r>
-              <a:rPr lang="en-CA" dirty="0">
-                <a:latin typeface="urw-din"/>
-              </a:rPr>
-              <a:t>Will have a full breakdown of what is on the exam and how grades will be distributed</a:t>
-            </a:r>
-          </a:p>
-          <a:p>
-            <a:pPr lvl="2"/>
-            <a:r>
-              <a:rPr lang="en-CA" dirty="0">
-                <a:latin typeface="urw-din"/>
-              </a:rPr>
-              <a:t>Final Exam - Dec 17</a:t>
-            </a:r>
-            <a:r>
-              <a:rPr lang="en-CA" baseline="30000" dirty="0">
-                <a:latin typeface="urw-din"/>
-              </a:rPr>
-              <a:t>th</a:t>
-            </a:r>
-            <a:r>
-              <a:rPr lang="en-CA" dirty="0">
-                <a:latin typeface="urw-din"/>
-              </a:rPr>
-              <a:t> @ 4:00PM </a:t>
-            </a:r>
-          </a:p>
-        </p:txBody>
-      </p:sp>
-    </p:spTree>
-    <p:extLst>
-      <p:ext uri="{BB962C8B-B14F-4D97-AF65-F5344CB8AC3E}">
-        <p14:creationId xmlns:p14="http://schemas.microsoft.com/office/powerpoint/2010/main" val="3597469302"/>
-      </p:ext>
-    </p:extLst>
-  </p:cSld>
-  <p:clrMapOvr>
-    <a:masterClrMapping/>
-  </p:clrMapOvr>
-</p:sld>
-</file>
-
 <file path=ppt/slides/slide2.xml><?xml version="1.0" encoding="utf-8"?>
 <p:sld xmlns:a="http://schemas.openxmlformats.org/drawingml/2006/main" xmlns:r="http://schemas.openxmlformats.org/officeDocument/2006/relationships" xmlns:p="http://schemas.openxmlformats.org/presentationml/2006/main">
   <p:cSld>
@@ -6720,16 +6379,9 @@
             </a:r>
           </a:p>
           <a:p>
-            <a:pPr lvl="1"/>
-            <a:r>
-              <a:rPr lang="en-US" dirty="0">
-                <a:latin typeface="urw-din"/>
-              </a:rPr>
-              <a:t>Forward List (C++11)</a:t>
-            </a:r>
-          </a:p>
-          <a:p>
-            <a:pPr lvl="1"/>
+            <a:pPr marL="457200" lvl="1" indent="0">
+              <a:buNone/>
+            </a:pPr>
             <a:endParaRPr lang="en-US" dirty="0">
               <a:latin typeface="urw-din"/>
             </a:endParaRPr>
@@ -6757,14 +6409,17 @@
               <a:rPr lang="en-US" dirty="0">
                 <a:latin typeface="urw-din"/>
               </a:rPr>
-              <a:t>Not necessarily contiguous memory</a:t>
-            </a:r>
-          </a:p>
-          <a:p>
-            <a:pPr lvl="1"/>
-            <a:endParaRPr lang="en-US" dirty="0">
-              <a:latin typeface="urw-din"/>
-            </a:endParaRPr>
+              <a:t>Arrays and Vectors usually in contiguous memory, though not necessarily</a:t>
+            </a:r>
+          </a:p>
+          <a:p>
+            <a:pPr lvl="2"/>
+            <a:r>
+              <a:rPr lang="en-US" dirty="0">
+                <a:latin typeface="urw-din"/>
+              </a:rPr>
+              <a:t>Lists and Deques Not usually not (in contiguous memory)</a:t>
+            </a:r>
           </a:p>
           <a:p>
             <a:pPr lvl="1"/>
@@ -6933,23 +6588,8 @@
               <a:rPr lang="en-US" dirty="0">
                 <a:latin typeface="urw-din"/>
               </a:rPr>
-              <a:t>Provides a different interface for a sequence container</a:t>
-            </a:r>
-          </a:p>
-          <a:p>
-            <a:pPr lvl="2"/>
-            <a:r>
-              <a:rPr lang="en-US" dirty="0">
-                <a:latin typeface="urw-din"/>
-              </a:rPr>
-              <a:t>We did this with project #1! </a:t>
-            </a:r>
-          </a:p>
-          <a:p>
-            <a:pPr lvl="1"/>
-            <a:endParaRPr lang="en-US" dirty="0">
-              <a:latin typeface="urw-din"/>
-            </a:endParaRPr>
+              <a:t>Provides a different interface/access for a sequence container</a:t>
+            </a:r>
           </a:p>
           <a:p>
             <a:pPr lvl="1"/>
@@ -7127,7 +6767,18 @@
               <a:rPr lang="en-US" dirty="0">
                 <a:latin typeface="urw-din"/>
               </a:rPr>
-              <a:t>Implement sorted data structures that can be quickly searched </a:t>
+              <a:t>Implement sorted data structures that can be quickly searched, </a:t>
+            </a:r>
+            <a:br>
+              <a:rPr lang="en-US" dirty="0">
+                <a:latin typeface="urw-din"/>
+              </a:rPr>
+            </a:br>
+            <a:r>
+              <a:rPr lang="en-US" dirty="0">
+                <a:latin typeface="urw-din"/>
+              </a:rPr>
+              <a:t>often a red-black tree.</a:t>
             </a:r>
           </a:p>
           <a:p>
@@ -7426,7 +7077,7 @@
                   <a:schemeClr val="bg1"/>
                 </a:solidFill>
               </a:rPr>
-              <a:t>Functions / Functors</a:t>
+              <a:t>Predicate Functions / Functors</a:t>
             </a:r>
             <a:endParaRPr lang="en-CA" dirty="0">
               <a:solidFill>
@@ -7690,9 +7341,93 @@
           </a:p>
           <a:p>
             <a:pPr lvl="1"/>
-            <a:endParaRPr lang="en-US" dirty="0">
-              <a:latin typeface="urw-din"/>
-            </a:endParaRPr>
+            <a:r>
+              <a:rPr lang="en-US" dirty="0">
+                <a:latin typeface="urw-din"/>
+              </a:rPr>
+              <a:t>They tie containers with the algorithm library. </a:t>
+            </a:r>
+          </a:p>
+          <a:p>
+            <a:pPr lvl="2"/>
+            <a:r>
+              <a:rPr lang="en-US" dirty="0">
+                <a:latin typeface="urw-din"/>
+              </a:rPr>
+              <a:t>Written to “look like” and </a:t>
+            </a:r>
+            <a:r>
+              <a:rPr lang="en-US" i="1" dirty="0">
+                <a:latin typeface="urw-din"/>
+              </a:rPr>
+              <a:t>somewhat </a:t>
+            </a:r>
+            <a:r>
+              <a:rPr lang="en-US" dirty="0">
+                <a:latin typeface="urw-din"/>
+              </a:rPr>
+              <a:t>behave like pointers - but aren’t </a:t>
+            </a:r>
+            <a:r>
+              <a:rPr lang="en-US" i="1" dirty="0">
+                <a:latin typeface="urw-din"/>
+              </a:rPr>
+              <a:t>at all</a:t>
+            </a:r>
+          </a:p>
+          <a:p>
+            <a:pPr lvl="2"/>
+            <a:r>
+              <a:rPr lang="en-US" dirty="0">
+                <a:latin typeface="urw-din"/>
+              </a:rPr>
+              <a:t>Allow moving around &amp; accessing data within a container</a:t>
+            </a:r>
+          </a:p>
+          <a:p>
+            <a:pPr lvl="2"/>
+            <a:r>
+              <a:rPr lang="en-US" dirty="0">
+                <a:latin typeface="urw-din"/>
+              </a:rPr>
+              <a:t>“Iterate” means “repeat”</a:t>
+            </a:r>
+          </a:p>
+          <a:p>
+            <a:pPr lvl="2"/>
+            <a:r>
+              <a:rPr lang="en-US" dirty="0">
+                <a:latin typeface="urw-din"/>
+              </a:rPr>
+              <a:t>May restrict operations that you may perform</a:t>
+            </a:r>
+          </a:p>
+          <a:p>
+            <a:pPr lvl="3"/>
+            <a:r>
+              <a:rPr lang="en-US" dirty="0">
+                <a:latin typeface="urw-din"/>
+              </a:rPr>
+              <a:t>Such as pointer arithmetic (add, decrement)</a:t>
+            </a:r>
+          </a:p>
+          <a:p>
+            <a:pPr lvl="2"/>
+            <a:r>
+              <a:rPr lang="en-US" dirty="0">
+                <a:latin typeface="urw-din"/>
+              </a:rPr>
+              <a:t>Can reduce complexity of a program</a:t>
+            </a:r>
+          </a:p>
+          <a:p>
+            <a:pPr lvl="2"/>
+            <a:r>
+              <a:rPr lang="en-US" dirty="0">
+                <a:latin typeface="urw-din"/>
+              </a:rPr>
+              <a:t>Not intended to reduce execution time (not that they are “slow” though…)</a:t>
+            </a:r>
           </a:p>
           <a:p>
             <a:pPr lvl="1"/>
@@ -7700,7 +7435,19 @@
               <a:rPr lang="en-US" dirty="0">
                 <a:latin typeface="urw-din"/>
               </a:rPr>
-              <a:t>They reduce the complexity and execution time of program</a:t>
+              <a:t>Iterators are </a:t>
+            </a:r>
+            <a:r>
+              <a:rPr lang="en-US" b="1" dirty="0">
+                <a:latin typeface="urw-din"/>
+              </a:rPr>
+              <a:t>NOT</a:t>
+            </a:r>
+            <a:r>
+              <a:rPr lang="en-US" dirty="0">
+                <a:latin typeface="urw-din"/>
+              </a:rPr>
+              <a:t> raw memory addresses (even though the look like pointers)</a:t>
             </a:r>
           </a:p>
           <a:p>
@@ -7709,82 +7456,19 @@
               <a:rPr lang="en-US" dirty="0">
                 <a:latin typeface="urw-din"/>
               </a:rPr>
-              <a:t>Similar too pointers but are typically more complex</a:t>
-            </a:r>
-          </a:p>
-          <a:p>
-            <a:pPr lvl="2"/>
-            <a:r>
-              <a:rPr lang="en-US" dirty="0">
-                <a:latin typeface="urw-din"/>
-              </a:rPr>
-              <a:t>Can iterate over data that’s on file system, spread across many machines, or generated locally in a programmatic fashion </a:t>
-            </a:r>
-          </a:p>
-          <a:p>
-            <a:pPr lvl="2"/>
-            <a:r>
-              <a:rPr lang="en-US" dirty="0">
-                <a:latin typeface="urw-din"/>
-              </a:rPr>
-              <a:t>May restrict operations that you may perform</a:t>
-            </a:r>
-          </a:p>
-          <a:p>
-            <a:pPr lvl="3"/>
-            <a:r>
-              <a:rPr lang="en-US" dirty="0">
-                <a:latin typeface="urw-din"/>
-              </a:rPr>
-              <a:t>Such as pointer arithmetic (add, decrement)</a:t>
-            </a:r>
-          </a:p>
-          <a:p>
-            <a:pPr lvl="1"/>
-            <a:endParaRPr lang="en-US" dirty="0">
-              <a:latin typeface="urw-din"/>
-            </a:endParaRPr>
-          </a:p>
-          <a:p>
-            <a:pPr lvl="1"/>
-            <a:r>
-              <a:rPr lang="en-US" dirty="0">
-                <a:latin typeface="urw-din"/>
-              </a:rPr>
-              <a:t>Iterators are </a:t>
+              <a:t>You cannot call </a:t>
             </a:r>
             <a:r>
               <a:rPr lang="en-US" b="1" dirty="0">
                 <a:latin typeface="urw-din"/>
               </a:rPr>
-              <a:t>NOT</a:t>
-            </a:r>
-            <a:r>
-              <a:rPr lang="en-US" dirty="0">
-                <a:latin typeface="urw-din"/>
-              </a:rPr>
-              <a:t> raw memory addresses</a:t>
-            </a:r>
-          </a:p>
-          <a:p>
-            <a:pPr lvl="2"/>
-            <a:r>
-              <a:rPr lang="en-US" dirty="0">
-                <a:latin typeface="urw-din"/>
-              </a:rPr>
-              <a:t>You cannot call </a:t>
-            </a:r>
-            <a:r>
-              <a:rPr lang="en-US" b="1" dirty="0">
-                <a:latin typeface="urw-din"/>
-              </a:rPr>
               <a:t>delete</a:t>
             </a:r>
             <a:r>
               <a:rPr lang="en-US" dirty="0">
                 <a:latin typeface="urw-din"/>
               </a:rPr>
-              <a:t> on an iterator</a:t>
+              <a:t> on an iterator, for instance</a:t>
             </a:r>
           </a:p>
           <a:p>

</xml_diff>